<commit_message>
Small updates to Week 2 slides
</commit_message>
<xml_diff>
--- a/Week2/Slides/Week 2.pptx
+++ b/Week2/Slides/Week 2.pptx
@@ -161,7 +161,7 @@
   </p:defaultTextStyle>
   <p:extLst>
     <p:ext uri="{EFAFB233-063F-42B5-8137-9DF3F51BA10A}">
-      <p15:sldGuideLst xmlns:p15="http://schemas.microsoft.com/office/powerpoint/2012/main" xmlns="">
+      <p15:sldGuideLst xmlns="" xmlns:p15="http://schemas.microsoft.com/office/powerpoint/2012/main">
         <p15:guide id="1" orient="horz" pos="2160">
           <p15:clr>
             <a:srgbClr val="A4A3A4"/>
@@ -297,11 +297,11 @@
         </c:dLbls>
         <c:marker val="1"/>
         <c:smooth val="0"/>
-        <c:axId val="-2132058504"/>
-        <c:axId val="-2124251544"/>
+        <c:axId val="-2141541928"/>
+        <c:axId val="-2141736136"/>
       </c:lineChart>
       <c:catAx>
-        <c:axId val="-2132058504"/>
+        <c:axId val="-2141541928"/>
         <c:scaling>
           <c:orientation val="minMax"/>
         </c:scaling>
@@ -325,7 +325,7 @@
         <c:majorTickMark val="out"/>
         <c:minorTickMark val="none"/>
         <c:tickLblPos val="nextTo"/>
-        <c:crossAx val="-2124251544"/>
+        <c:crossAx val="-2141736136"/>
         <c:crosses val="autoZero"/>
         <c:auto val="1"/>
         <c:lblAlgn val="ctr"/>
@@ -333,7 +333,7 @@
         <c:noMultiLvlLbl val="0"/>
       </c:catAx>
       <c:valAx>
-        <c:axId val="-2124251544"/>
+        <c:axId val="-2141736136"/>
         <c:scaling>
           <c:orientation val="minMax"/>
         </c:scaling>
@@ -384,7 +384,7 @@
             <a:endParaRPr lang="en-US"/>
           </a:p>
         </c:txPr>
-        <c:crossAx val="-2132058504"/>
+        <c:crossAx val="-2141541928"/>
         <c:crosses val="autoZero"/>
         <c:crossBetween val="between"/>
       </c:valAx>
@@ -539,11 +539,11 @@
           <c:showBubbleSize val="0"/>
         </c:dLbls>
         <c:gapWidth val="150"/>
-        <c:axId val="-2123911336"/>
-        <c:axId val="-2123907912"/>
+        <c:axId val="-2141670104"/>
+        <c:axId val="-2141666680"/>
       </c:barChart>
       <c:catAx>
-        <c:axId val="-2123911336"/>
+        <c:axId val="-2141670104"/>
         <c:scaling>
           <c:orientation val="minMax"/>
         </c:scaling>
@@ -567,7 +567,7 @@
         <c:majorTickMark val="none"/>
         <c:minorTickMark val="none"/>
         <c:tickLblPos val="nextTo"/>
-        <c:crossAx val="-2123907912"/>
+        <c:crossAx val="-2141666680"/>
         <c:crosses val="autoZero"/>
         <c:auto val="1"/>
         <c:lblAlgn val="ctr"/>
@@ -575,7 +575,7 @@
         <c:noMultiLvlLbl val="0"/>
       </c:catAx>
       <c:valAx>
-        <c:axId val="-2123907912"/>
+        <c:axId val="-2141666680"/>
         <c:scaling>
           <c:orientation val="minMax"/>
         </c:scaling>
@@ -632,7 +632,7 @@
             <a:endParaRPr lang="en-US"/>
           </a:p>
         </c:txPr>
-        <c:crossAx val="-2123911336"/>
+        <c:crossAx val="-2141670104"/>
         <c:crosses val="autoZero"/>
         <c:crossBetween val="between"/>
       </c:valAx>
@@ -1870,7 +1870,7 @@
           <a:p>
             <a:fld id="{90AF4669-11A5-AA4B-ACB6-1CD3E71EA0D2}" type="datetimeFigureOut">
               <a:rPr lang="en-US" smtClean="0"/>
-              <a:t>4/7/14</a:t>
+              <a:t>4/12/14</a:t>
             </a:fld>
             <a:endParaRPr lang="en-US"/>
           </a:p>
@@ -2428,7 +2428,7 @@
           <a:p>
             <a:fld id="{C95D1B94-35C6-4950-B226-D68A01DA1DCF}" type="datetimeFigureOut">
               <a:rPr lang="en-US" smtClean="0"/>
-              <a:t>4/7/14</a:t>
+              <a:t>4/12/14</a:t>
             </a:fld>
             <a:endParaRPr lang="en-US"/>
           </a:p>
@@ -2593,7 +2593,7 @@
           <a:p>
             <a:fld id="{C95D1B94-35C6-4950-B226-D68A01DA1DCF}" type="datetimeFigureOut">
               <a:rPr lang="en-US" smtClean="0"/>
-              <a:t>4/7/14</a:t>
+              <a:t>4/12/14</a:t>
             </a:fld>
             <a:endParaRPr lang="en-US"/>
           </a:p>
@@ -2768,7 +2768,7 @@
           <a:p>
             <a:fld id="{C95D1B94-35C6-4950-B226-D68A01DA1DCF}" type="datetimeFigureOut">
               <a:rPr lang="en-US" smtClean="0"/>
-              <a:t>4/7/14</a:t>
+              <a:t>4/12/14</a:t>
             </a:fld>
             <a:endParaRPr lang="en-US"/>
           </a:p>
@@ -2951,7 +2951,7 @@
           <a:p>
             <a:fld id="{C95D1B94-35C6-4950-B226-D68A01DA1DCF}" type="datetimeFigureOut">
               <a:rPr lang="en-US" smtClean="0"/>
-              <a:t>4/7/14</a:t>
+              <a:t>4/12/14</a:t>
             </a:fld>
             <a:endParaRPr lang="en-US"/>
           </a:p>
@@ -3213,7 +3213,7 @@
           <a:p>
             <a:fld id="{C95D1B94-35C6-4950-B226-D68A01DA1DCF}" type="datetimeFigureOut">
               <a:rPr lang="en-US" smtClean="0"/>
-              <a:t>4/7/14</a:t>
+              <a:t>4/12/14</a:t>
             </a:fld>
             <a:endParaRPr lang="en-US"/>
           </a:p>
@@ -3561,7 +3561,7 @@
           <a:p>
             <a:fld id="{C95D1B94-35C6-4950-B226-D68A01DA1DCF}" type="datetimeFigureOut">
               <a:rPr lang="en-US" smtClean="0"/>
-              <a:t>4/7/14</a:t>
+              <a:t>4/12/14</a:t>
             </a:fld>
             <a:endParaRPr lang="en-US"/>
           </a:p>
@@ -3869,7 +3869,7 @@
           <a:p>
             <a:fld id="{C95D1B94-35C6-4950-B226-D68A01DA1DCF}" type="datetimeFigureOut">
               <a:rPr lang="en-US" smtClean="0"/>
-              <a:t>4/7/14</a:t>
+              <a:t>4/12/14</a:t>
             </a:fld>
             <a:endParaRPr lang="en-US"/>
           </a:p>
@@ -4096,7 +4096,7 @@
           <a:p>
             <a:fld id="{C95D1B94-35C6-4950-B226-D68A01DA1DCF}" type="datetimeFigureOut">
               <a:rPr lang="en-US" smtClean="0"/>
-              <a:t>4/7/14</a:t>
+              <a:t>4/12/14</a:t>
             </a:fld>
             <a:endParaRPr lang="en-US"/>
           </a:p>
@@ -4186,7 +4186,7 @@
           <a:p>
             <a:fld id="{C95D1B94-35C6-4950-B226-D68A01DA1DCF}" type="datetimeFigureOut">
               <a:rPr lang="en-US" smtClean="0"/>
-              <a:t>4/7/14</a:t>
+              <a:t>4/12/14</a:t>
             </a:fld>
             <a:endParaRPr lang="en-US"/>
           </a:p>
@@ -4474,7 +4474,7 @@
           <a:p>
             <a:fld id="{C95D1B94-35C6-4950-B226-D68A01DA1DCF}" type="datetimeFigureOut">
               <a:rPr lang="en-US" smtClean="0"/>
-              <a:t>4/7/14</a:t>
+              <a:t>4/12/14</a:t>
             </a:fld>
             <a:endParaRPr lang="en-US"/>
           </a:p>
@@ -4743,7 +4743,7 @@
           <a:p>
             <a:fld id="{C95D1B94-35C6-4950-B226-D68A01DA1DCF}" type="datetimeFigureOut">
               <a:rPr lang="en-US" smtClean="0"/>
-              <a:t>4/7/14</a:t>
+              <a:t>4/12/14</a:t>
             </a:fld>
             <a:endParaRPr lang="en-US"/>
           </a:p>
@@ -4953,7 +4953,7 @@
           <a:p>
             <a:fld id="{C95D1B94-35C6-4950-B226-D68A01DA1DCF}" type="datetimeFigureOut">
               <a:rPr lang="en-US" smtClean="0"/>
-              <a:t>4/7/14</a:t>
+              <a:t>4/12/14</a:t>
             </a:fld>
             <a:endParaRPr lang="en-US"/>
           </a:p>
@@ -15801,11 +15801,7 @@
             </a:r>
             <a:r>
               <a:rPr lang="en-US" dirty="0" smtClean="0"/>
-              <a:t> </a:t>
-            </a:r>
-            <a:r>
-              <a:rPr lang="en-US" dirty="0" smtClean="0"/>
-              <a:t>is a special variable type that matches the right-hand side</a:t>
+              <a:t> is a special variable type that matches the right-hand side</a:t>
             </a:r>
           </a:p>
           <a:p>
@@ -15887,11 +15883,7 @@
             <a:pPr lvl="1"/>
             <a:r>
               <a:rPr lang="en-US" dirty="0" smtClean="0"/>
-              <a:t>If </a:t>
-            </a:r>
-            <a:r>
-              <a:rPr lang="en-US" dirty="0" smtClean="0"/>
-              <a:t>you don’t understand </a:t>
+              <a:t>If you don’t understand </a:t>
             </a:r>
             <a:r>
               <a:rPr lang="en-US" dirty="0">
@@ -15943,11 +15935,7 @@
             </a:r>
             <a:r>
               <a:rPr lang="en-US" dirty="0" smtClean="0"/>
-              <a:t> </a:t>
-            </a:r>
-            <a:r>
-              <a:rPr lang="en-US" dirty="0" smtClean="0"/>
-              <a:t>brush up on pointers</a:t>
+              <a:t> brush up on pointers</a:t>
             </a:r>
             <a:endParaRPr lang="en-US" dirty="0"/>
           </a:p>
@@ -16738,11 +16726,23 @@
                 </a:highlight>
                 <a:latin typeface="Consolas" panose="020B0609020204030204" pitchFamily="49" charset="0"/>
               </a:rPr>
-              <a:t>    unsigned</a:t>
+              <a:t>    </a:t>
             </a:r>
             <a:r>
               <a:rPr lang="en-US" sz="1600" dirty="0" smtClean="0">
                 <a:solidFill>
+                  <a:srgbClr val="0000FF"/>
+                </a:solidFill>
+                <a:highlight>
+                  <a:srgbClr val="FFFFFF"/>
+                </a:highlight>
+                <a:latin typeface="Consolas" panose="020B0609020204030204" pitchFamily="49" charset="0"/>
+              </a:rPr>
+              <a:t>auto</a:t>
+            </a:r>
+            <a:r>
+              <a:rPr lang="en-US" sz="1600" dirty="0" smtClean="0">
+                <a:solidFill>
                   <a:srgbClr val="000000"/>
                 </a:solidFill>
                 <a:highlight>
@@ -16753,30 +16753,6 @@
               <a:t> </a:t>
             </a:r>
             <a:r>
-              <a:rPr lang="en-US" sz="1600" dirty="0" err="1">
-                <a:solidFill>
-                  <a:srgbClr val="0000FF"/>
-                </a:solidFill>
-                <a:highlight>
-                  <a:srgbClr val="FFFFFF"/>
-                </a:highlight>
-                <a:latin typeface="Consolas" panose="020B0609020204030204" pitchFamily="49" charset="0"/>
-              </a:rPr>
-              <a:t>int</a:t>
-            </a:r>
-            <a:r>
-              <a:rPr lang="en-US" sz="1600" dirty="0">
-                <a:solidFill>
-                  <a:srgbClr val="000000"/>
-                </a:solidFill>
-                <a:highlight>
-                  <a:srgbClr val="FFFFFF"/>
-                </a:highlight>
-                <a:latin typeface="Consolas" panose="020B0609020204030204" pitchFamily="49" charset="0"/>
-              </a:rPr>
-              <a:t> </a:t>
-            </a:r>
-            <a:r>
               <a:rPr lang="en-US" sz="1600" dirty="0" smtClean="0">
                 <a:solidFill>
                   <a:srgbClr val="000000"/>
@@ -16789,7 +16765,7 @@
               <a:t>mode </a:t>
             </a:r>
             <a:r>
-              <a:rPr lang="en-US" sz="1600" dirty="0">
+              <a:rPr lang="en-US" sz="1600" dirty="0" smtClean="0">
                 <a:solidFill>
                   <a:srgbClr val="000000"/>
                 </a:solidFill>
@@ -16824,6 +16800,15 @@
               </a:rPr>
               <a:t>;</a:t>
             </a:r>
+            <a:endParaRPr lang="en-US" sz="1600" dirty="0" smtClean="0">
+              <a:solidFill>
+                <a:srgbClr val="000000"/>
+              </a:solidFill>
+              <a:highlight>
+                <a:srgbClr val="FFFFFF"/>
+              </a:highlight>
+              <a:latin typeface="Consolas" panose="020B0609020204030204" pitchFamily="49" charset="0"/>
+            </a:endParaRPr>
           </a:p>
           <a:p>
             <a:pPr marL="0" indent="0">
@@ -20606,11 +20591,7 @@
             <a:pPr lvl="2"/>
             <a:r>
               <a:rPr lang="en-US" dirty="0" smtClean="0"/>
-              <a:t>On WP8, seems to always be the minimum value of 480 </a:t>
-            </a:r>
-            <a:r>
-              <a:rPr lang="en-US" dirty="0" smtClean="0"/>
-              <a:t>samples</a:t>
+              <a:t>On WP8, seems to always be the minimum value of 480 samples</a:t>
             </a:r>
           </a:p>
           <a:p>
@@ -20619,7 +20600,6 @@
               <a:rPr lang="en-US" dirty="0" smtClean="0"/>
               <a:t>At 48KHz recording, this means we get 10ms chunks at once</a:t>
             </a:r>
-            <a:endParaRPr lang="en-US" dirty="0" smtClean="0"/>
           </a:p>
           <a:p>
             <a:pPr lvl="1"/>
@@ -23235,19 +23215,7 @@
                 </a:highlight>
                 <a:latin typeface="Consolas" panose="020B0609020204030204" pitchFamily="49" charset="0"/>
               </a:rPr>
-              <a:t> ) </a:t>
-            </a:r>
-            <a:r>
-              <a:rPr lang="en-US" dirty="0" smtClean="0">
-                <a:solidFill>
-                  <a:srgbClr val="000000"/>
-                </a:solidFill>
-                <a:highlight>
-                  <a:srgbClr val="FFFFFF"/>
-                </a:highlight>
-                <a:latin typeface="Consolas" panose="020B0609020204030204" pitchFamily="49" charset="0"/>
-              </a:rPr>
-              <a:t>{</a:t>
+              <a:t> ) {</a:t>
             </a:r>
           </a:p>
           <a:p>

</xml_diff>